<commit_message>
Updated the Around me usecase diagram in ppt.
</commit_message>
<xml_diff>
--- a/Presentation/Phase2/Phase2_Presentation_v3.pptx
+++ b/Presentation/Phase2/Phase2_Presentation_v3.pptx
@@ -210,7 +210,7 @@
           <a:p>
             <a:fld id="{B47CC751-7B90-4E44-8970-1A24FD373230}" type="datetimeFigureOut">
               <a:rPr lang="en-US" smtClean="0"/>
-              <a:t>10/16/2021</a:t>
+              <a:t>10/17/2021</a:t>
             </a:fld>
             <a:endParaRPr lang="en-US"/>
           </a:p>
@@ -675,6 +675,90 @@
           <a:p>
             <a:fld id="{0D3F5159-98AC-47FE-BEC5-23B567B87837}" type="slidenum">
               <a:rPr lang="en-US" smtClean="0"/>
+              <a:t>11</a:t>
+            </a:fld>
+            <a:endParaRPr lang="en-US"/>
+          </a:p>
+        </p:txBody>
+      </p:sp>
+    </p:spTree>
+    <p:extLst>
+      <p:ext uri="{BB962C8B-B14F-4D97-AF65-F5344CB8AC3E}">
+        <p14:creationId xmlns:p14="http://schemas.microsoft.com/office/powerpoint/2010/main" val="2949734813"/>
+      </p:ext>
+    </p:extLst>
+  </p:cSld>
+  <p:clrMapOvr>
+    <a:masterClrMapping/>
+  </p:clrMapOvr>
+</p:notes>
+</file>
+
+<file path=ppt/notesSlides/notesSlide3.xml><?xml version="1.0" encoding="utf-8"?>
+<p:notes xmlns:a="http://schemas.openxmlformats.org/drawingml/2006/main" xmlns:r="http://schemas.openxmlformats.org/officeDocument/2006/relationships" xmlns:p="http://schemas.openxmlformats.org/presentationml/2006/main">
+  <p:cSld>
+    <p:spTree>
+      <p:nvGrpSpPr>
+        <p:cNvPr id="1" name=""/>
+        <p:cNvGrpSpPr/>
+        <p:nvPr/>
+      </p:nvGrpSpPr>
+      <p:grpSpPr>
+        <a:xfrm>
+          <a:off x="0" y="0"/>
+          <a:ext cx="0" cy="0"/>
+          <a:chOff x="0" y="0"/>
+          <a:chExt cx="0" cy="0"/>
+        </a:xfrm>
+      </p:grpSpPr>
+      <p:sp>
+        <p:nvSpPr>
+          <p:cNvPr id="2" name="Slide Image Placeholder 1"/>
+          <p:cNvSpPr>
+            <a:spLocks noGrp="1" noRot="1" noChangeAspect="1"/>
+          </p:cNvSpPr>
+          <p:nvPr>
+            <p:ph type="sldImg"/>
+          </p:nvPr>
+        </p:nvSpPr>
+        <p:spPr/>
+      </p:sp>
+      <p:sp>
+        <p:nvSpPr>
+          <p:cNvPr id="3" name="Notes Placeholder 2"/>
+          <p:cNvSpPr>
+            <a:spLocks noGrp="1"/>
+          </p:cNvSpPr>
+          <p:nvPr>
+            <p:ph type="body" idx="1"/>
+          </p:nvPr>
+        </p:nvSpPr>
+        <p:spPr/>
+        <p:txBody>
+          <a:bodyPr/>
+          <a:lstStyle/>
+          <a:p>
+            <a:endParaRPr lang="en-US" dirty="0"/>
+          </a:p>
+        </p:txBody>
+      </p:sp>
+      <p:sp>
+        <p:nvSpPr>
+          <p:cNvPr id="4" name="Slide Number Placeholder 3"/>
+          <p:cNvSpPr>
+            <a:spLocks noGrp="1"/>
+          </p:cNvSpPr>
+          <p:nvPr>
+            <p:ph type="sldNum" sz="quarter" idx="5"/>
+          </p:nvPr>
+        </p:nvSpPr>
+        <p:spPr/>
+        <p:txBody>
+          <a:bodyPr/>
+          <a:lstStyle/>
+          <a:p>
+            <a:fld id="{0D3F5159-98AC-47FE-BEC5-23B567B87837}" type="slidenum">
+              <a:rPr lang="en-US" smtClean="0"/>
               <a:t>14</a:t>
             </a:fld>
             <a:endParaRPr lang="en-US"/>
@@ -886,7 +970,7 @@
           <a:p>
             <a:fld id="{8001A94D-C7C9-4245-B10B-5883F449F70C}" type="datetimeFigureOut">
               <a:rPr lang="en-IN" smtClean="0"/>
-              <a:t>16-10-2021</a:t>
+              <a:t>17-10-2021</a:t>
             </a:fld>
             <a:endParaRPr lang="en-IN"/>
           </a:p>
@@ -1076,7 +1160,7 @@
           <a:p>
             <a:fld id="{8001A94D-C7C9-4245-B10B-5883F449F70C}" type="datetimeFigureOut">
               <a:rPr lang="en-IN" smtClean="0"/>
-              <a:t>16-10-2021</a:t>
+              <a:t>17-10-2021</a:t>
             </a:fld>
             <a:endParaRPr lang="en-IN"/>
           </a:p>
@@ -1256,7 +1340,7 @@
           <a:p>
             <a:fld id="{8001A94D-C7C9-4245-B10B-5883F449F70C}" type="datetimeFigureOut">
               <a:rPr lang="en-IN" smtClean="0"/>
-              <a:t>16-10-2021</a:t>
+              <a:t>17-10-2021</a:t>
             </a:fld>
             <a:endParaRPr lang="en-IN"/>
           </a:p>
@@ -1426,7 +1510,7 @@
           <a:p>
             <a:fld id="{8001A94D-C7C9-4245-B10B-5883F449F70C}" type="datetimeFigureOut">
               <a:rPr lang="en-IN" smtClean="0"/>
-              <a:t>16-10-2021</a:t>
+              <a:t>17-10-2021</a:t>
             </a:fld>
             <a:endParaRPr lang="en-IN"/>
           </a:p>
@@ -1682,7 +1766,7 @@
           <a:p>
             <a:fld id="{8001A94D-C7C9-4245-B10B-5883F449F70C}" type="datetimeFigureOut">
               <a:rPr lang="en-IN" smtClean="0"/>
-              <a:t>16-10-2021</a:t>
+              <a:t>17-10-2021</a:t>
             </a:fld>
             <a:endParaRPr lang="en-IN"/>
           </a:p>
@@ -1970,7 +2054,7 @@
           <a:p>
             <a:fld id="{8001A94D-C7C9-4245-B10B-5883F449F70C}" type="datetimeFigureOut">
               <a:rPr lang="en-IN" smtClean="0"/>
-              <a:t>16-10-2021</a:t>
+              <a:t>17-10-2021</a:t>
             </a:fld>
             <a:endParaRPr lang="en-IN"/>
           </a:p>
@@ -2408,7 +2492,7 @@
           <a:p>
             <a:fld id="{8001A94D-C7C9-4245-B10B-5883F449F70C}" type="datetimeFigureOut">
               <a:rPr lang="en-IN" smtClean="0"/>
-              <a:t>16-10-2021</a:t>
+              <a:t>17-10-2021</a:t>
             </a:fld>
             <a:endParaRPr lang="en-IN"/>
           </a:p>
@@ -2526,7 +2610,7 @@
           <a:p>
             <a:fld id="{8001A94D-C7C9-4245-B10B-5883F449F70C}" type="datetimeFigureOut">
               <a:rPr lang="en-IN" smtClean="0"/>
-              <a:t>16-10-2021</a:t>
+              <a:t>17-10-2021</a:t>
             </a:fld>
             <a:endParaRPr lang="en-IN"/>
           </a:p>
@@ -2621,7 +2705,7 @@
           <a:p>
             <a:fld id="{8001A94D-C7C9-4245-B10B-5883F449F70C}" type="datetimeFigureOut">
               <a:rPr lang="en-IN" smtClean="0"/>
-              <a:t>16-10-2021</a:t>
+              <a:t>17-10-2021</a:t>
             </a:fld>
             <a:endParaRPr lang="en-IN"/>
           </a:p>
@@ -2977,7 +3061,7 @@
           <a:p>
             <a:fld id="{8001A94D-C7C9-4245-B10B-5883F449F70C}" type="datetimeFigureOut">
               <a:rPr lang="en-IN" smtClean="0"/>
-              <a:t>16-10-2021</a:t>
+              <a:t>17-10-2021</a:t>
             </a:fld>
             <a:endParaRPr lang="en-IN"/>
           </a:p>
@@ -3285,7 +3369,7 @@
           <a:p>
             <a:fld id="{8001A94D-C7C9-4245-B10B-5883F449F70C}" type="datetimeFigureOut">
               <a:rPr lang="en-IN" smtClean="0"/>
-              <a:t>16-10-2021</a:t>
+              <a:t>17-10-2021</a:t>
             </a:fld>
             <a:endParaRPr lang="en-IN"/>
           </a:p>
@@ -3548,7 +3632,7 @@
           <a:p>
             <a:fld id="{8001A94D-C7C9-4245-B10B-5883F449F70C}" type="datetimeFigureOut">
               <a:rPr lang="en-IN" smtClean="0"/>
-              <a:t>16-10-2021</a:t>
+              <a:t>17-10-2021</a:t>
             </a:fld>
             <a:endParaRPr lang="en-IN"/>
           </a:p>
@@ -4321,41 +4405,6 @@
           <a:chExt cx="0" cy="0"/>
         </a:xfrm>
       </p:grpSpPr>
-      <p:pic>
-        <p:nvPicPr>
-          <p:cNvPr id="7" name="Content Placeholder 6" descr="Diagram&#10;&#10;Description automatically generated with low confidence">
-            <a:extLst>
-              <a:ext uri="{FF2B5EF4-FFF2-40B4-BE49-F238E27FC236}">
-                <a16:creationId xmlns:a16="http://schemas.microsoft.com/office/drawing/2014/main" id="{26704D1C-B7B9-45BC-9C92-F188196C7B41}"/>
-              </a:ext>
-            </a:extLst>
-          </p:cNvPr>
-          <p:cNvPicPr>
-            <a:picLocks noGrp="1" noChangeAspect="1"/>
-          </p:cNvPicPr>
-          <p:nvPr>
-            <p:ph idx="4294967295"/>
-          </p:nvPr>
-        </p:nvPicPr>
-        <p:blipFill>
-          <a:blip r:embed="rId2">
-            <a:extLst>
-              <a:ext uri="{28A0092B-C50C-407E-A947-70E740481C1C}">
-                <a14:useLocalDpi xmlns:a14="http://schemas.microsoft.com/office/drawing/2010/main" val="0"/>
-              </a:ext>
-            </a:extLst>
-          </a:blip>
-          <a:stretch>
-            <a:fillRect/>
-          </a:stretch>
-        </p:blipFill>
-        <p:spPr>
-          <a:xfrm>
-            <a:off x="4522866" y="769938"/>
-            <a:ext cx="7508875" cy="4833937"/>
-          </a:xfrm>
-        </p:spPr>
-      </p:pic>
       <p:sp>
         <p:nvSpPr>
           <p:cNvPr id="2" name="Title 1"/>
@@ -4426,6 +4475,42 @@
           <a:xfrm>
             <a:off x="137076" y="135468"/>
             <a:ext cx="999533" cy="951585"/>
+          </a:xfrm>
+          <a:prstGeom prst="rect">
+            <a:avLst/>
+          </a:prstGeom>
+        </p:spPr>
+      </p:pic>
+      <p:pic>
+        <p:nvPicPr>
+          <p:cNvPr id="8" name="Picture 7" descr="Diagram&#10;&#10;Description automatically generated">
+            <a:extLst>
+              <a:ext uri="{FF2B5EF4-FFF2-40B4-BE49-F238E27FC236}">
+                <a16:creationId xmlns:a16="http://schemas.microsoft.com/office/drawing/2014/main" id="{04FAEF3D-0AAA-48D4-B15F-5DAF1642A9A1}"/>
+              </a:ext>
+            </a:extLst>
+          </p:cNvPr>
+          <p:cNvPicPr>
+            <a:picLocks noChangeAspect="1"/>
+          </p:cNvPicPr>
+          <p:nvPr/>
+        </p:nvPicPr>
+        <p:blipFill>
+          <a:blip r:embed="rId4">
+            <a:extLst>
+              <a:ext uri="{28A0092B-C50C-407E-A947-70E740481C1C}">
+                <a14:useLocalDpi xmlns:a14="http://schemas.microsoft.com/office/drawing/2010/main" val="0"/>
+              </a:ext>
+            </a:extLst>
+          </a:blip>
+          <a:stretch>
+            <a:fillRect/>
+          </a:stretch>
+        </p:blipFill>
+        <p:spPr>
+          <a:xfrm>
+            <a:off x="2978870" y="163749"/>
+            <a:ext cx="9076054" cy="6510429"/>
           </a:xfrm>
           <a:prstGeom prst="rect">
             <a:avLst/>

</xml_diff>